<commit_message>
Addition of slides about backtracking
</commit_message>
<xml_diff>
--- a/Complete search/BusquedaCompleta.pptx
+++ b/Complete search/BusquedaCompleta.pptx
@@ -5,23 +5,25 @@
     <p:sldMasterId id="2147483648" r:id="rId1"/>
   </p:sldMasterIdLst>
   <p:notesMasterIdLst>
-    <p:notesMasterId r:id="rId16"/>
+    <p:notesMasterId r:id="rId18"/>
   </p:notesMasterIdLst>
   <p:sldIdLst>
     <p:sldId id="258" r:id="rId2"/>
     <p:sldId id="330" r:id="rId3"/>
-    <p:sldId id="277" r:id="rId4"/>
-    <p:sldId id="326" r:id="rId5"/>
-    <p:sldId id="325" r:id="rId6"/>
-    <p:sldId id="327" r:id="rId7"/>
-    <p:sldId id="308" r:id="rId8"/>
-    <p:sldId id="329" r:id="rId9"/>
-    <p:sldId id="328" r:id="rId10"/>
-    <p:sldId id="331" r:id="rId11"/>
-    <p:sldId id="332" r:id="rId12"/>
-    <p:sldId id="334" r:id="rId13"/>
-    <p:sldId id="333" r:id="rId14"/>
-    <p:sldId id="291" r:id="rId15"/>
+    <p:sldId id="336" r:id="rId4"/>
+    <p:sldId id="277" r:id="rId5"/>
+    <p:sldId id="326" r:id="rId6"/>
+    <p:sldId id="325" r:id="rId7"/>
+    <p:sldId id="327" r:id="rId8"/>
+    <p:sldId id="308" r:id="rId9"/>
+    <p:sldId id="329" r:id="rId10"/>
+    <p:sldId id="328" r:id="rId11"/>
+    <p:sldId id="331" r:id="rId12"/>
+    <p:sldId id="332" r:id="rId13"/>
+    <p:sldId id="334" r:id="rId14"/>
+    <p:sldId id="333" r:id="rId15"/>
+    <p:sldId id="335" r:id="rId16"/>
+    <p:sldId id="291" r:id="rId17"/>
   </p:sldIdLst>
   <p:sldSz cx="9144000" cy="6858000" type="screen4x3"/>
   <p:notesSz cx="6858000" cy="9144000"/>
@@ -127,6 +129,7 @@
           <p14:sldIdLst>
             <p14:sldId id="258"/>
             <p14:sldId id="330"/>
+            <p14:sldId id="336"/>
             <p14:sldId id="277"/>
             <p14:sldId id="326"/>
             <p14:sldId id="325"/>
@@ -138,6 +141,7 @@
             <p14:sldId id="332"/>
             <p14:sldId id="334"/>
             <p14:sldId id="333"/>
+            <p14:sldId id="335"/>
           </p14:sldIdLst>
         </p14:section>
         <p14:section name="Sección sin título" id="{636F59BE-EF12-40DC-8BF3-0D895D6E77E4}">
@@ -171,6 +175,39 @@
     <inkml:context xml:id="ctx0">
       <inkml:inkSource xml:id="inkSrc0">
         <inkml:traceFormat>
+          <inkml:channel name="X" type="integer" max="32767" units="cm"/>
+          <inkml:channel name="Y" type="integer" max="32767" units="cm"/>
+          <inkml:channel name="F" type="integer" max="4095" units="deg"/>
+          <inkml:channel name="T" type="integer" max="2.14748E9" units="dev"/>
+        </inkml:traceFormat>
+        <inkml:channelProperties>
+          <inkml:channelProperty channel="X" name="resolution" value="2155.72363" units="1/cm"/>
+          <inkml:channelProperty channel="Y" name="resolution" value="3449.15796" units="1/cm"/>
+          <inkml:channelProperty channel="F" name="resolution" value="11.375" units="1/deg"/>
+          <inkml:channelProperty channel="T" name="resolution" value="1" units="1/dev"/>
+        </inkml:channelProperties>
+      </inkml:inkSource>
+      <inkml:timestamp xml:id="ts0" timeString="2021-04-08T23:40:24.563"/>
+    </inkml:context>
+    <inkml:brush xml:id="br0">
+      <inkml:brushProperty name="width" value="0.05292" units="cm"/>
+      <inkml:brushProperty name="height" value="0.05292" units="cm"/>
+      <inkml:brushProperty name="color" value="#FF0000"/>
+    </inkml:brush>
+  </inkml:definitions>
+  <inkml:trace contextRef="#ctx0" brushRef="#br0">4076 10801 975 0,'0'0'812'16,"0"0"-300"-16,0 0-199 16,0 0-19-16,0 0-26 15,0 0-32-15,0-4-9 16,0 4-62-16,0 0-12 16,0 12-12-16,3 3-141 15,2 1 0-15,-2 8 0 16,0-4 0-16,2 4 0 15,0 3 0-15,9-7 0 16,4 4 0-16,3-5 0 16,2-3 0-16,-4 0 0 0,-6 0 0 15,-2-9 0-15,-3 1 0 16,-3 0 0-16,3 0 0 16,-1 0 0-16,-1 0 0 15,-3 0 0-15,5 0 0 16,-1 0 0-16,-2-5 0 15,-2 2 0-15,0-5 0 16,-3 0 0-16,0 0 0 16,0 0 0-16,0 0 0 15,0 0 0-15,0 0 0 16,0 0 0-16,0 0 0 16,0 0 0-16,-6 0 0 0,-6 0 0 15,0 0 0-15,-11 7 0 16,2 9 0-16,-7 0 0 15,4 3 0-15,0 2 0 16,0-6 0-16,3-3 0 16,5 0 0-16,0-4 0 15,4 0 0-15,-1 0 0 16,7 0 0-16,1-5 0 16,2 2 0-16,-7-2 0 15,4 5 0-15,-1-4 0 16,-1 4 0-16,2-4 0 15,2-4 0-15,4 4 0 16,-3-4 0-16,-3 0 0 16,1 4 0-16,-2 0 0 15,1-1 0-15,-1 2 0 0,4-2 0 16,-2-3 0-16,5 0 0 16,0 0 0-16,0 0 0 15,0 0 0-15,0 0 0 16,0 0 0-16,0 0 0 15,0 0 0-15,0 0 0 16,5-8-54-16,18-7-311 16,-2-1-277-16,0 8-312 0</inkml:trace>
+  <inkml:trace contextRef="#ctx0" brushRef="#br0" timeOffset="682.34">3652 11125 393 0,'0'0'897'0,"0"0"-333"16,0 0-263-16,0 0-38 15,0 0-36-15,0 0-49 16,0 0-21-16,31-13 7 16,-12 13-11-16,-1 0-11 15,8 0-1-15,5 0 5 0,4 0 13 16,-1 0-27-16,2 0-53 15,-2 0-79-15,-2 0 0 16,-8 0 0-16,-3 0 0 16,-5 0 0-16,-1 0 0 15,4 0 0-15,-3 5 0 16,-3-2 0-16,5 2 0 16,0-5 0-16,0 3 0 15,-2 1 0-15,5-4 0 16,-4 4 0-16,3-4 0 15,-9 0 0-15,5 0 0 16,-8 0 0-16,4 0 0 16,-7 0 0-16,-1 0 0 15,1 0 0-15,-5 0 0 16,3 0 0-16,1 0 0 0,-1 0-57 16,2 4-263-1,1 0-279-15,-3 4-458 0</inkml:trace>
+  <inkml:trace contextRef="#ctx0" brushRef="#br0" timeOffset="3812.08">12326 11333 1043 0,'0'0'801'0,"0"0"-212"15,0 0-226-15,0 0-37 16,0 0-54-16,0 0-44 15,0 0-19-15,162-39-16 16,-122 28-121-16,13 3-72 16,-1-5 0-16,0 5 0 15,-5 5 0-15,-10 3 0 0,-10 0 0 16,-1 0 0-16,-7 0 0 16,1 0 0-16,-4 0 0 15,5 0 0-15,-2 0 0 16,-4 3 0-16,3 2 0 15,-2-2 0-15,-3 2 0 16,-4-5 0-16,1 3 0 16,-2-3 0-16,3 5 0 15,-4-5 0-15,-1 0 0 16,4 3 0-16,-2-3 0 16,2 0 0-16,-4 0 0 15,4 0 0-15,-5 0 0 16,-5 0 0-16,0 0 0 0,0 0 0 15,0 0 0 1,0 0 0-16,0 0 0 0,0 0 0 16,0 0 0-16,-5 0 0 15,-5 0 0-15,4 0 0 16,-7 0 0-16,-2 0 0 16,-2 0 0-16,-11 8-29 15,4 4-536-15,1 4-476 0</inkml:trace>
+  <inkml:trace contextRef="#ctx0" brushRef="#br0" timeOffset="21925.11">12223 10726 933 0,'0'0'397'0,"0"0"91"15,0 0-201-15,0 0 15 16,0 0-40-16,0 0-47 15,10 0-39-15,-2 0-25 0,-5 0-19 16,3 0-35-16,-2 0-5 16,-1 0-26-16,8 0-18 15,-1 0-6-15,11 0-17 16,6 0 14-16,6 0 6 16,2 0-13-16,-4 0 13 15,-1 5-11-15,3-5-7 16,2 0 17-16,-4 3 4 15,3-3-6-15,6 0-15 16,-7 0-27-16,-1 5 0 16,2-5 0-16,0 0 0 15,-5 3 0-15,-2 0 0 16,5-3 0-16,-4 0 0 16,3 0 0-16,3 0 0 0,-5 0 0 15,-2 0 0-15,-1 0 0 16,-5 0 0-16,-5 0 0 15,-3 0 0-15,-8 0 0 16,-2 0 0-16,0 0 0 16,2 0 0-16,0 0 0 15,0 0 0-15,1 0 0 16,6 8 0-16,-8 0 0 16,1 0 0-16,-2 0 0 15,2 0 0-15,2 0 0 16,-2-4 0-16,-2 4 0 15,-2 0 0-15,3 0 0 16,1 0 0-16,-5 3 0 16,0 9 0-16,0 4 0 0,0 11 0 15,0 5 0-15,-5 7 0 16,-3 5 0-16,-9-1 0 16,5-4 0-16,0-4 0 15,6-3 0-15,1-12 0 16,0-5 0-16,5-3 0 15,0-8 0-15,0-4 0 16,0-8 0-16,0 0 0 16,0 0 0-16,0 0 0 15,0-8 0-15,-11-4 0 16,6-4 0-16,-14-3 0 16,4 3-218-16,2 3-962 0</inkml:trace>
+</inkml:ink>
+</file>
+
+<file path=ppt/ink/ink2.xml><?xml version="1.0" encoding="utf-8"?>
+<inkml:ink xmlns:inkml="http://www.w3.org/2003/InkML">
+  <inkml:definitions>
+    <inkml:context xml:id="ctx0">
+      <inkml:inkSource xml:id="inkSrc0">
+        <inkml:traceFormat>
           <inkml:channel name="X" type="integer" min="-2.14748E9" max="2.14748E9" units="cm"/>
           <inkml:channel name="Y" type="integer" min="-2.14748E9" max="2.14748E9" units="cm"/>
           <inkml:channel name="F" type="integer" max="32767" units="dev"/>
@@ -192,7 +229,7 @@
 </inkml:ink>
 </file>
 
-<file path=ppt/ink/ink2.xml><?xml version="1.0" encoding="utf-8"?>
+<file path=ppt/ink/ink3.xml><?xml version="1.0" encoding="utf-8"?>
 <inkml:ink xmlns:inkml="http://www.w3.org/2003/InkML">
   <inkml:definitions>
     <inkml:context xml:id="ctx0">
@@ -302,7 +339,7 @@
             <a:fld id="{F4FAB538-628E-104D-8583-83FBDA663EAD}" type="datetimeFigureOut">
               <a:rPr lang="en-US" smtClean="0"/>
               <a:pPr/>
-              <a:t>4/7/2021</a:t>
+              <a:t>4/8/2021</a:t>
             </a:fld>
             <a:endParaRPr lang="en-US" dirty="0"/>
           </a:p>
@@ -722,7 +759,7 @@
             <a:fld id="{39923DF9-DA97-0C44-B7A0-AB7B1AA67FC3}" type="slidenum">
               <a:rPr lang="en-US" smtClean="0"/>
               <a:pPr/>
-              <a:t>3</a:t>
+              <a:t>4</a:t>
             </a:fld>
             <a:endParaRPr lang="en-US" dirty="0"/>
           </a:p>
@@ -807,7 +844,7 @@
             <a:fld id="{39923DF9-DA97-0C44-B7A0-AB7B1AA67FC3}" type="slidenum">
               <a:rPr lang="en-US" smtClean="0"/>
               <a:pPr/>
-              <a:t>4</a:t>
+              <a:t>5</a:t>
             </a:fld>
             <a:endParaRPr lang="en-US" dirty="0"/>
           </a:p>
@@ -892,7 +929,7 @@
             <a:fld id="{39923DF9-DA97-0C44-B7A0-AB7B1AA67FC3}" type="slidenum">
               <a:rPr lang="en-US" smtClean="0"/>
               <a:pPr/>
-              <a:t>5</a:t>
+              <a:t>6</a:t>
             </a:fld>
             <a:endParaRPr lang="en-US" dirty="0"/>
           </a:p>
@@ -977,7 +1014,7 @@
             <a:fld id="{39923DF9-DA97-0C44-B7A0-AB7B1AA67FC3}" type="slidenum">
               <a:rPr lang="en-US" smtClean="0"/>
               <a:pPr/>
-              <a:t>6</a:t>
+              <a:t>7</a:t>
             </a:fld>
             <a:endParaRPr lang="en-US" dirty="0"/>
           </a:p>
@@ -1062,7 +1099,7 @@
             <a:fld id="{39923DF9-DA97-0C44-B7A0-AB7B1AA67FC3}" type="slidenum">
               <a:rPr lang="en-US" smtClean="0"/>
               <a:pPr/>
-              <a:t>7</a:t>
+              <a:t>8</a:t>
             </a:fld>
             <a:endParaRPr lang="en-US" dirty="0"/>
           </a:p>
@@ -1147,7 +1184,7 @@
             <a:fld id="{39923DF9-DA97-0C44-B7A0-AB7B1AA67FC3}" type="slidenum">
               <a:rPr lang="en-US" smtClean="0"/>
               <a:pPr/>
-              <a:t>14</a:t>
+              <a:t>16</a:t>
             </a:fld>
             <a:endParaRPr lang="en-US" dirty="0"/>
           </a:p>
@@ -1466,7 +1503,7 @@
             <a:fld id="{818F800F-9FA6-FE45-B974-AB17141DF911}" type="datetimeFigureOut">
               <a:rPr lang="en-US" smtClean="0"/>
               <a:pPr/>
-              <a:t>4/7/2021</a:t>
+              <a:t>4/8/2021</a:t>
             </a:fld>
             <a:endParaRPr lang="en-US" dirty="0"/>
           </a:p>
@@ -1863,7 +1900,7 @@
             <a:fld id="{818F800F-9FA6-FE45-B974-AB17141DF911}" type="datetimeFigureOut">
               <a:rPr lang="en-US" smtClean="0"/>
               <a:pPr/>
-              <a:t>4/7/2021</a:t>
+              <a:t>4/8/2021</a:t>
             </a:fld>
             <a:endParaRPr lang="en-US" dirty="0"/>
           </a:p>
@@ -2153,7 +2190,7 @@
             <a:fld id="{818F800F-9FA6-FE45-B974-AB17141DF911}" type="datetimeFigureOut">
               <a:rPr lang="en-US" smtClean="0"/>
               <a:pPr/>
-              <a:t>4/7/2021</a:t>
+              <a:t>4/8/2021</a:t>
             </a:fld>
             <a:endParaRPr lang="en-US" dirty="0"/>
           </a:p>
@@ -2577,7 +2614,7 @@
             <a:fld id="{818F800F-9FA6-FE45-B974-AB17141DF911}" type="datetimeFigureOut">
               <a:rPr lang="en-US" smtClean="0"/>
               <a:pPr/>
-              <a:t>4/7/2021</a:t>
+              <a:t>4/8/2021</a:t>
             </a:fld>
             <a:endParaRPr lang="en-US" dirty="0"/>
           </a:p>
@@ -2697,7 +2734,7 @@
             <a:fld id="{818F800F-9FA6-FE45-B974-AB17141DF911}" type="datetimeFigureOut">
               <a:rPr lang="en-US" smtClean="0"/>
               <a:pPr/>
-              <a:t>4/7/2021</a:t>
+              <a:t>4/8/2021</a:t>
             </a:fld>
             <a:endParaRPr lang="en-US" dirty="0"/>
           </a:p>
@@ -3048,7 +3085,7 @@
             <a:fld id="{818F800F-9FA6-FE45-B974-AB17141DF911}" type="datetimeFigureOut">
               <a:rPr lang="en-US" smtClean="0"/>
               <a:pPr/>
-              <a:t>4/7/2021</a:t>
+              <a:t>4/8/2021</a:t>
             </a:fld>
             <a:endParaRPr lang="en-US" dirty="0"/>
           </a:p>
@@ -3596,6 +3633,435 @@
           <p:cNvPr id="2" name="Title 1">
             <a:extLst>
               <a:ext uri="{FF2B5EF4-FFF2-40B4-BE49-F238E27FC236}">
+                <a16:creationId xmlns:a16="http://schemas.microsoft.com/office/drawing/2014/main" id="{2B2179BA-B504-400E-887A-74F4A063F12B}"/>
+              </a:ext>
+            </a:extLst>
+          </p:cNvPr>
+          <p:cNvSpPr>
+            <a:spLocks noGrp="1"/>
+          </p:cNvSpPr>
+          <p:nvPr>
+            <p:ph type="title"/>
+          </p:nvPr>
+        </p:nvSpPr>
+        <p:spPr/>
+        <p:txBody>
+          <a:bodyPr/>
+          <a:lstStyle/>
+          <a:p>
+            <a:r>
+              <a:rPr lang="en-GB" dirty="0"/>
+              <a:t>Operations</a:t>
+            </a:r>
+          </a:p>
+        </p:txBody>
+      </p:sp>
+      <p:sp>
+        <p:nvSpPr>
+          <p:cNvPr id="3" name="Content Placeholder 2">
+            <a:extLst>
+              <a:ext uri="{FF2B5EF4-FFF2-40B4-BE49-F238E27FC236}">
+                <a16:creationId xmlns:a16="http://schemas.microsoft.com/office/drawing/2014/main" id="{1F236050-014D-4E76-91CE-55E989BE334F}"/>
+              </a:ext>
+            </a:extLst>
+          </p:cNvPr>
+          <p:cNvSpPr>
+            <a:spLocks noGrp="1"/>
+          </p:cNvSpPr>
+          <p:nvPr>
+            <p:ph idx="1"/>
+          </p:nvPr>
+        </p:nvSpPr>
+        <p:spPr/>
+        <p:txBody>
+          <a:bodyPr/>
+          <a:lstStyle/>
+          <a:p>
+            <a:r>
+              <a:rPr lang="en-US" b="1" i="0" dirty="0">
+                <a:solidFill>
+                  <a:srgbClr val="292929"/>
+                </a:solidFill>
+                <a:effectLst/>
+                <a:latin typeface="medium-content-serif-font"/>
+              </a:rPr>
+              <a:t>1) Set the </a:t>
+            </a:r>
+            <a:r>
+              <a:rPr lang="en-US" b="1" i="0" dirty="0" err="1">
+                <a:solidFill>
+                  <a:srgbClr val="292929"/>
+                </a:solidFill>
+                <a:effectLst/>
+                <a:latin typeface="medium-content-serif-font"/>
+              </a:rPr>
+              <a:t>i-th</a:t>
+            </a:r>
+            <a:r>
+              <a:rPr lang="en-US" b="1" i="0" dirty="0">
+                <a:solidFill>
+                  <a:srgbClr val="292929"/>
+                </a:solidFill>
+                <a:effectLst/>
+                <a:latin typeface="medium-content-serif-font"/>
+              </a:rPr>
+              <a:t> bit : </a:t>
+            </a:r>
+            <a:r>
+              <a:rPr lang="en-US" b="0" i="0" dirty="0">
+                <a:solidFill>
+                  <a:srgbClr val="292929"/>
+                </a:solidFill>
+                <a:effectLst/>
+                <a:latin typeface="medium-content-serif-font"/>
+              </a:rPr>
+              <a:t>B = B | (1&lt;&lt;</a:t>
+            </a:r>
+            <a:r>
+              <a:rPr lang="en-US" b="0" i="0" dirty="0" err="1">
+                <a:solidFill>
+                  <a:srgbClr val="292929"/>
+                </a:solidFill>
+                <a:effectLst/>
+                <a:latin typeface="medium-content-serif-font"/>
+              </a:rPr>
+              <a:t>i</a:t>
+            </a:r>
+            <a:r>
+              <a:rPr lang="en-US" b="0" i="0" dirty="0">
+                <a:solidFill>
+                  <a:srgbClr val="292929"/>
+                </a:solidFill>
+                <a:effectLst/>
+                <a:latin typeface="medium-content-serif-font"/>
+              </a:rPr>
+              <a:t>)</a:t>
+            </a:r>
+            <a:br>
+              <a:rPr lang="en-US" b="1" i="0" dirty="0">
+                <a:solidFill>
+                  <a:srgbClr val="292929"/>
+                </a:solidFill>
+                <a:effectLst/>
+                <a:latin typeface="medium-content-serif-font"/>
+              </a:rPr>
+            </a:br>
+            <a:r>
+              <a:rPr lang="en-US" b="1" i="0" dirty="0">
+                <a:solidFill>
+                  <a:srgbClr val="292929"/>
+                </a:solidFill>
+                <a:effectLst/>
+                <a:latin typeface="medium-content-serif-font"/>
+              </a:rPr>
+              <a:t>2) Unset the </a:t>
+            </a:r>
+            <a:r>
+              <a:rPr lang="en-US" b="1" i="0" dirty="0" err="1">
+                <a:solidFill>
+                  <a:srgbClr val="292929"/>
+                </a:solidFill>
+                <a:effectLst/>
+                <a:latin typeface="medium-content-serif-font"/>
+              </a:rPr>
+              <a:t>i-th</a:t>
+            </a:r>
+            <a:r>
+              <a:rPr lang="en-US" b="1" i="0" dirty="0">
+                <a:solidFill>
+                  <a:srgbClr val="292929"/>
+                </a:solidFill>
+                <a:effectLst/>
+                <a:latin typeface="medium-content-serif-font"/>
+              </a:rPr>
+              <a:t> bit: </a:t>
+            </a:r>
+            <a:r>
+              <a:rPr lang="en-US" b="0" i="0" dirty="0">
+                <a:solidFill>
+                  <a:srgbClr val="292929"/>
+                </a:solidFill>
+                <a:effectLst/>
+                <a:latin typeface="medium-content-serif-font"/>
+              </a:rPr>
+              <a:t>B = B &amp;! (1&lt;&lt;</a:t>
+            </a:r>
+            <a:r>
+              <a:rPr lang="en-US" b="0" i="0" dirty="0" err="1">
+                <a:solidFill>
+                  <a:srgbClr val="292929"/>
+                </a:solidFill>
+                <a:effectLst/>
+                <a:latin typeface="medium-content-serif-font"/>
+              </a:rPr>
+              <a:t>i</a:t>
+            </a:r>
+            <a:r>
+              <a:rPr lang="en-US" b="0" i="0" dirty="0">
+                <a:solidFill>
+                  <a:srgbClr val="292929"/>
+                </a:solidFill>
+                <a:effectLst/>
+                <a:latin typeface="medium-content-serif-font"/>
+              </a:rPr>
+              <a:t>)</a:t>
+            </a:r>
+            <a:br>
+              <a:rPr lang="en-US" b="1" i="0" dirty="0">
+                <a:solidFill>
+                  <a:srgbClr val="292929"/>
+                </a:solidFill>
+                <a:effectLst/>
+                <a:latin typeface="medium-content-serif-font"/>
+              </a:rPr>
+            </a:br>
+            <a:r>
+              <a:rPr lang="en-US" b="1" i="0" dirty="0">
+                <a:solidFill>
+                  <a:srgbClr val="292929"/>
+                </a:solidFill>
+                <a:effectLst/>
+                <a:latin typeface="medium-content-serif-font"/>
+              </a:rPr>
+              <a:t>3) Check if </a:t>
+            </a:r>
+            <a:r>
+              <a:rPr lang="en-US" b="1" i="0" dirty="0" err="1">
+                <a:solidFill>
+                  <a:srgbClr val="292929"/>
+                </a:solidFill>
+                <a:effectLst/>
+                <a:latin typeface="medium-content-serif-font"/>
+              </a:rPr>
+              <a:t>i-th</a:t>
+            </a:r>
+            <a:r>
+              <a:rPr lang="en-US" b="1" i="0" dirty="0">
+                <a:solidFill>
+                  <a:srgbClr val="292929"/>
+                </a:solidFill>
+                <a:effectLst/>
+                <a:latin typeface="medium-content-serif-font"/>
+              </a:rPr>
+              <a:t> bit is set: </a:t>
+            </a:r>
+            <a:r>
+              <a:rPr lang="en-US" b="0" i="0" dirty="0">
+                <a:solidFill>
+                  <a:srgbClr val="292929"/>
+                </a:solidFill>
+                <a:effectLst/>
+                <a:latin typeface="medium-content-serif-font"/>
+              </a:rPr>
+              <a:t>B &amp; (1&lt;&lt;</a:t>
+            </a:r>
+            <a:r>
+              <a:rPr lang="en-US" b="0" i="0" dirty="0" err="1">
+                <a:solidFill>
+                  <a:srgbClr val="292929"/>
+                </a:solidFill>
+                <a:effectLst/>
+                <a:latin typeface="medium-content-serif-font"/>
+              </a:rPr>
+              <a:t>i</a:t>
+            </a:r>
+            <a:r>
+              <a:rPr lang="en-US" b="0" i="0" dirty="0">
+                <a:solidFill>
+                  <a:srgbClr val="292929"/>
+                </a:solidFill>
+                <a:effectLst/>
+                <a:latin typeface="medium-content-serif-font"/>
+              </a:rPr>
+              <a:t>)</a:t>
+            </a:r>
+            <a:r>
+              <a:rPr lang="en-US" b="1" i="0" dirty="0">
+                <a:solidFill>
+                  <a:srgbClr val="292929"/>
+                </a:solidFill>
+                <a:effectLst/>
+                <a:latin typeface="medium-content-serif-font"/>
+              </a:rPr>
+              <a:t> </a:t>
+            </a:r>
+            <a:r>
+              <a:rPr lang="en-US" b="0" i="0" dirty="0">
+                <a:solidFill>
+                  <a:srgbClr val="292929"/>
+                </a:solidFill>
+                <a:effectLst/>
+                <a:latin typeface="medium-content-serif-font"/>
+              </a:rPr>
+              <a:t>→</a:t>
+            </a:r>
+            <a:r>
+              <a:rPr lang="en-US" b="0" i="1" dirty="0">
+                <a:solidFill>
+                  <a:srgbClr val="292929"/>
+                </a:solidFill>
+                <a:effectLst/>
+                <a:latin typeface="medium-content-serif-font"/>
+              </a:rPr>
+              <a:t> if </a:t>
+            </a:r>
+            <a:r>
+              <a:rPr lang="en-US" b="0" i="1" dirty="0" err="1">
+                <a:solidFill>
+                  <a:srgbClr val="292929"/>
+                </a:solidFill>
+                <a:effectLst/>
+                <a:latin typeface="medium-content-serif-font"/>
+              </a:rPr>
+              <a:t>i-th</a:t>
+            </a:r>
+            <a:r>
+              <a:rPr lang="en-US" b="0" i="1" dirty="0">
+                <a:solidFill>
+                  <a:srgbClr val="292929"/>
+                </a:solidFill>
+                <a:effectLst/>
+                <a:latin typeface="medium-content-serif-font"/>
+              </a:rPr>
+              <a:t> bit is set, we get a non-zero integer otherwise we get a zero</a:t>
+            </a:r>
+            <a:br>
+              <a:rPr lang="en-US" b="0" i="1" dirty="0">
+                <a:solidFill>
+                  <a:srgbClr val="292929"/>
+                </a:solidFill>
+                <a:effectLst/>
+                <a:latin typeface="medium-content-serif-font"/>
+              </a:rPr>
+            </a:br>
+            <a:r>
+              <a:rPr lang="en-US" b="1" i="1" dirty="0">
+                <a:solidFill>
+                  <a:srgbClr val="292929"/>
+                </a:solidFill>
+                <a:effectLst/>
+                <a:latin typeface="medium-content-serif-font"/>
+              </a:rPr>
+              <a:t>4) Swap the </a:t>
+            </a:r>
+            <a:r>
+              <a:rPr lang="en-US" b="1" i="1" dirty="0" err="1">
+                <a:solidFill>
+                  <a:srgbClr val="292929"/>
+                </a:solidFill>
+                <a:effectLst/>
+                <a:latin typeface="medium-content-serif-font"/>
+              </a:rPr>
+              <a:t>i-th</a:t>
+            </a:r>
+            <a:r>
+              <a:rPr lang="en-US" b="1" i="1" dirty="0">
+                <a:solidFill>
+                  <a:srgbClr val="292929"/>
+                </a:solidFill>
+                <a:effectLst/>
+                <a:latin typeface="medium-content-serif-font"/>
+              </a:rPr>
+              <a:t> item of the set:</a:t>
+            </a:r>
+            <a:r>
+              <a:rPr lang="en-US" b="0" i="1" dirty="0">
+                <a:solidFill>
+                  <a:srgbClr val="292929"/>
+                </a:solidFill>
+                <a:effectLst/>
+                <a:latin typeface="medium-content-serif-font"/>
+              </a:rPr>
+              <a:t> B =B ^ (1&lt;&lt;</a:t>
+            </a:r>
+            <a:r>
+              <a:rPr lang="en-US" b="0" i="1" dirty="0" err="1">
+                <a:solidFill>
+                  <a:srgbClr val="292929"/>
+                </a:solidFill>
+                <a:effectLst/>
+                <a:latin typeface="medium-content-serif-font"/>
+              </a:rPr>
+              <a:t>i</a:t>
+            </a:r>
+            <a:r>
+              <a:rPr lang="en-US" b="0" i="1" dirty="0">
+                <a:solidFill>
+                  <a:srgbClr val="292929"/>
+                </a:solidFill>
+                <a:effectLst/>
+                <a:latin typeface="medium-content-serif-font"/>
+              </a:rPr>
+              <a:t>)</a:t>
+            </a:r>
+            <a:br>
+              <a:rPr lang="en-US" b="0" i="1" dirty="0">
+                <a:solidFill>
+                  <a:srgbClr val="292929"/>
+                </a:solidFill>
+                <a:effectLst/>
+                <a:latin typeface="medium-content-serif-font"/>
+              </a:rPr>
+            </a:br>
+            <a:r>
+              <a:rPr lang="en-US" b="1" i="1" dirty="0">
+                <a:solidFill>
+                  <a:srgbClr val="292929"/>
+                </a:solidFill>
+                <a:effectLst/>
+                <a:latin typeface="medium-content-serif-font"/>
+              </a:rPr>
+              <a:t>5) Turn On all the bits in a set of size ‘n’:</a:t>
+            </a:r>
+            <a:r>
+              <a:rPr lang="en-US" b="0" i="1" dirty="0">
+                <a:solidFill>
+                  <a:srgbClr val="292929"/>
+                </a:solidFill>
+                <a:effectLst/>
+                <a:latin typeface="medium-content-serif-font"/>
+              </a:rPr>
+              <a:t> B = (1&lt;&lt;n)-1</a:t>
+            </a:r>
+            <a:endParaRPr lang="en-GB" dirty="0"/>
+          </a:p>
+        </p:txBody>
+      </p:sp>
+    </p:spTree>
+    <p:extLst>
+      <p:ext uri="{BB962C8B-B14F-4D97-AF65-F5344CB8AC3E}">
+        <p14:creationId xmlns:p14="http://schemas.microsoft.com/office/powerpoint/2010/main" val="2985432943"/>
+      </p:ext>
+    </p:extLst>
+  </p:cSld>
+  <p:clrMapOvr>
+    <a:masterClrMapping/>
+  </p:clrMapOvr>
+</p:sld>
+</file>
+
+<file path=ppt/slides/slide11.xml><?xml version="1.0" encoding="utf-8"?>
+<p:sld xmlns:a="http://schemas.openxmlformats.org/drawingml/2006/main" xmlns:r="http://schemas.openxmlformats.org/officeDocument/2006/relationships" xmlns:p="http://schemas.openxmlformats.org/presentationml/2006/main">
+  <p:cSld>
+    <p:spTree>
+      <p:nvGrpSpPr>
+        <p:cNvPr id="1" name=""/>
+        <p:cNvGrpSpPr/>
+        <p:nvPr/>
+      </p:nvGrpSpPr>
+      <p:grpSpPr>
+        <a:xfrm>
+          <a:off x="0" y="0"/>
+          <a:ext cx="0" cy="0"/>
+          <a:chOff x="0" y="0"/>
+          <a:chExt cx="0" cy="0"/>
+        </a:xfrm>
+      </p:grpSpPr>
+      <p:sp>
+        <p:nvSpPr>
+          <p:cNvPr id="2" name="Title 1">
+            <a:extLst>
+              <a:ext uri="{FF2B5EF4-FFF2-40B4-BE49-F238E27FC236}">
                 <a16:creationId xmlns:a16="http://schemas.microsoft.com/office/drawing/2014/main" id="{495DBD1D-DDEA-43FB-A2D5-D3F709548BED}"/>
               </a:ext>
             </a:extLst>
@@ -3770,179 +4236,6 @@
     <p:extLst>
       <p:ext uri="{BB962C8B-B14F-4D97-AF65-F5344CB8AC3E}">
         <p14:creationId xmlns:p14="http://schemas.microsoft.com/office/powerpoint/2010/main" val="2522564943"/>
-      </p:ext>
-    </p:extLst>
-  </p:cSld>
-  <p:clrMapOvr>
-    <a:masterClrMapping/>
-  </p:clrMapOvr>
-</p:sld>
-</file>
-
-<file path=ppt/slides/slide11.xml><?xml version="1.0" encoding="utf-8"?>
-<p:sld xmlns:a="http://schemas.openxmlformats.org/drawingml/2006/main" xmlns:r="http://schemas.openxmlformats.org/officeDocument/2006/relationships" xmlns:p="http://schemas.openxmlformats.org/presentationml/2006/main">
-  <p:cSld>
-    <p:spTree>
-      <p:nvGrpSpPr>
-        <p:cNvPr id="1" name=""/>
-        <p:cNvGrpSpPr/>
-        <p:nvPr/>
-      </p:nvGrpSpPr>
-      <p:grpSpPr>
-        <a:xfrm>
-          <a:off x="0" y="0"/>
-          <a:ext cx="0" cy="0"/>
-          <a:chOff x="0" y="0"/>
-          <a:chExt cx="0" cy="0"/>
-        </a:xfrm>
-      </p:grpSpPr>
-      <p:sp>
-        <p:nvSpPr>
-          <p:cNvPr id="2" name="Title 1">
-            <a:extLst>
-              <a:ext uri="{FF2B5EF4-FFF2-40B4-BE49-F238E27FC236}">
-                <a16:creationId xmlns:a16="http://schemas.microsoft.com/office/drawing/2014/main" id="{764C89C7-D0B0-439F-89AC-F9917862B6A8}"/>
-              </a:ext>
-            </a:extLst>
-          </p:cNvPr>
-          <p:cNvSpPr>
-            <a:spLocks noGrp="1"/>
-          </p:cNvSpPr>
-          <p:nvPr>
-            <p:ph type="title"/>
-          </p:nvPr>
-        </p:nvSpPr>
-        <p:spPr/>
-        <p:txBody>
-          <a:bodyPr/>
-          <a:lstStyle/>
-          <a:p>
-            <a:r>
-              <a:rPr lang="en-GB" dirty="0"/>
-              <a:t>Next Permutation </a:t>
-            </a:r>
-          </a:p>
-        </p:txBody>
-      </p:sp>
-      <p:sp>
-        <p:nvSpPr>
-          <p:cNvPr id="3" name="Content Placeholder 2">
-            <a:extLst>
-              <a:ext uri="{FF2B5EF4-FFF2-40B4-BE49-F238E27FC236}">
-                <a16:creationId xmlns:a16="http://schemas.microsoft.com/office/drawing/2014/main" id="{67A5ED38-47A4-4C54-B243-D95EDAA1CC71}"/>
-              </a:ext>
-            </a:extLst>
-          </p:cNvPr>
-          <p:cNvSpPr>
-            <a:spLocks noGrp="1"/>
-          </p:cNvSpPr>
-          <p:nvPr>
-            <p:ph idx="1"/>
-          </p:nvPr>
-        </p:nvSpPr>
-        <p:spPr/>
-        <p:txBody>
-          <a:bodyPr/>
-          <a:lstStyle/>
-          <a:p>
-            <a:r>
-              <a:rPr lang="en-GB" dirty="0"/>
-              <a:t>C++ </a:t>
-            </a:r>
-            <a:r>
-              <a:rPr lang="en-GB" dirty="0" err="1"/>
-              <a:t>cuenta</a:t>
-            </a:r>
-            <a:r>
-              <a:rPr lang="en-GB" dirty="0"/>
-              <a:t> con la </a:t>
-            </a:r>
-            <a:r>
-              <a:rPr lang="en-GB" dirty="0" err="1"/>
-              <a:t>función</a:t>
-            </a:r>
-            <a:r>
-              <a:rPr lang="en-GB" dirty="0"/>
-              <a:t> </a:t>
-            </a:r>
-            <a:r>
-              <a:rPr lang="en-GB" dirty="0" err="1"/>
-              <a:t>next_permutation</a:t>
-            </a:r>
-            <a:r>
-              <a:rPr lang="en-GB" dirty="0"/>
-              <a:t> para </a:t>
-            </a:r>
-            <a:r>
-              <a:rPr lang="en-GB" dirty="0" err="1"/>
-              <a:t>generar</a:t>
-            </a:r>
-            <a:r>
-              <a:rPr lang="en-GB" dirty="0"/>
-              <a:t> </a:t>
-            </a:r>
-            <a:r>
-              <a:rPr lang="en-GB" dirty="0" err="1"/>
-              <a:t>permutaciones</a:t>
-            </a:r>
-            <a:r>
-              <a:rPr lang="en-GB" dirty="0"/>
-              <a:t> de forma </a:t>
-            </a:r>
-            <a:r>
-              <a:rPr lang="en-GB" dirty="0" err="1"/>
-              <a:t>ordenada</a:t>
-            </a:r>
-            <a:r>
-              <a:rPr lang="en-GB" dirty="0"/>
-              <a:t>:</a:t>
-            </a:r>
-          </a:p>
-          <a:p>
-            <a:endParaRPr lang="en-GB" dirty="0"/>
-          </a:p>
-          <a:p>
-            <a:pPr marL="0" indent="0">
-              <a:buNone/>
-            </a:pPr>
-            <a:endParaRPr lang="en-GB" dirty="0"/>
-          </a:p>
-        </p:txBody>
-      </p:sp>
-      <p:pic>
-        <p:nvPicPr>
-          <p:cNvPr id="6" name="Picture 5">
-            <a:extLst>
-              <a:ext uri="{FF2B5EF4-FFF2-40B4-BE49-F238E27FC236}">
-                <a16:creationId xmlns:a16="http://schemas.microsoft.com/office/drawing/2014/main" id="{B3F8CE67-DF11-4C0C-899E-30380DCA9DBD}"/>
-              </a:ext>
-            </a:extLst>
-          </p:cNvPr>
-          <p:cNvPicPr>
-            <a:picLocks noChangeAspect="1"/>
-          </p:cNvPicPr>
-          <p:nvPr/>
-        </p:nvPicPr>
-        <p:blipFill>
-          <a:blip r:embed="rId2"/>
-          <a:stretch>
-            <a:fillRect/>
-          </a:stretch>
-        </p:blipFill>
-        <p:spPr>
-          <a:xfrm>
-            <a:off x="584778" y="2658763"/>
-            <a:ext cx="7582557" cy="3467400"/>
-          </a:xfrm>
-          <a:prstGeom prst="rect">
-            <a:avLst/>
-          </a:prstGeom>
-        </p:spPr>
-      </p:pic>
-    </p:spTree>
-    <p:extLst>
-      <p:ext uri="{BB962C8B-B14F-4D97-AF65-F5344CB8AC3E}">
-        <p14:creationId xmlns:p14="http://schemas.microsoft.com/office/powerpoint/2010/main" val="1455910975"/>
       </p:ext>
     </p:extLst>
   </p:cSld>
@@ -4020,6 +4313,179 @@
           <a:p>
             <a:r>
               <a:rPr lang="en-GB" dirty="0"/>
+              <a:t>C++ </a:t>
+            </a:r>
+            <a:r>
+              <a:rPr lang="en-GB" dirty="0" err="1"/>
+              <a:t>cuenta</a:t>
+            </a:r>
+            <a:r>
+              <a:rPr lang="en-GB" dirty="0"/>
+              <a:t> con la </a:t>
+            </a:r>
+            <a:r>
+              <a:rPr lang="en-GB" dirty="0" err="1"/>
+              <a:t>función</a:t>
+            </a:r>
+            <a:r>
+              <a:rPr lang="en-GB" dirty="0"/>
+              <a:t> </a:t>
+            </a:r>
+            <a:r>
+              <a:rPr lang="en-GB" dirty="0" err="1"/>
+              <a:t>next_permutation</a:t>
+            </a:r>
+            <a:r>
+              <a:rPr lang="en-GB" dirty="0"/>
+              <a:t> para </a:t>
+            </a:r>
+            <a:r>
+              <a:rPr lang="en-GB" dirty="0" err="1"/>
+              <a:t>generar</a:t>
+            </a:r>
+            <a:r>
+              <a:rPr lang="en-GB" dirty="0"/>
+              <a:t> </a:t>
+            </a:r>
+            <a:r>
+              <a:rPr lang="en-GB" dirty="0" err="1"/>
+              <a:t>permutaciones</a:t>
+            </a:r>
+            <a:r>
+              <a:rPr lang="en-GB" dirty="0"/>
+              <a:t> de forma </a:t>
+            </a:r>
+            <a:r>
+              <a:rPr lang="en-GB" dirty="0" err="1"/>
+              <a:t>ordenada</a:t>
+            </a:r>
+            <a:r>
+              <a:rPr lang="en-GB" dirty="0"/>
+              <a:t>:</a:t>
+            </a:r>
+          </a:p>
+          <a:p>
+            <a:endParaRPr lang="en-GB" dirty="0"/>
+          </a:p>
+          <a:p>
+            <a:pPr marL="0" indent="0">
+              <a:buNone/>
+            </a:pPr>
+            <a:endParaRPr lang="en-GB" dirty="0"/>
+          </a:p>
+        </p:txBody>
+      </p:sp>
+      <p:pic>
+        <p:nvPicPr>
+          <p:cNvPr id="6" name="Picture 5">
+            <a:extLst>
+              <a:ext uri="{FF2B5EF4-FFF2-40B4-BE49-F238E27FC236}">
+                <a16:creationId xmlns:a16="http://schemas.microsoft.com/office/drawing/2014/main" id="{B3F8CE67-DF11-4C0C-899E-30380DCA9DBD}"/>
+              </a:ext>
+            </a:extLst>
+          </p:cNvPr>
+          <p:cNvPicPr>
+            <a:picLocks noChangeAspect="1"/>
+          </p:cNvPicPr>
+          <p:nvPr/>
+        </p:nvPicPr>
+        <p:blipFill>
+          <a:blip r:embed="rId2"/>
+          <a:stretch>
+            <a:fillRect/>
+          </a:stretch>
+        </p:blipFill>
+        <p:spPr>
+          <a:xfrm>
+            <a:off x="584778" y="2658763"/>
+            <a:ext cx="7582557" cy="3467400"/>
+          </a:xfrm>
+          <a:prstGeom prst="rect">
+            <a:avLst/>
+          </a:prstGeom>
+        </p:spPr>
+      </p:pic>
+    </p:spTree>
+    <p:extLst>
+      <p:ext uri="{BB962C8B-B14F-4D97-AF65-F5344CB8AC3E}">
+        <p14:creationId xmlns:p14="http://schemas.microsoft.com/office/powerpoint/2010/main" val="1455910975"/>
+      </p:ext>
+    </p:extLst>
+  </p:cSld>
+  <p:clrMapOvr>
+    <a:masterClrMapping/>
+  </p:clrMapOvr>
+</p:sld>
+</file>
+
+<file path=ppt/slides/slide13.xml><?xml version="1.0" encoding="utf-8"?>
+<p:sld xmlns:a="http://schemas.openxmlformats.org/drawingml/2006/main" xmlns:r="http://schemas.openxmlformats.org/officeDocument/2006/relationships" xmlns:p="http://schemas.openxmlformats.org/presentationml/2006/main">
+  <p:cSld>
+    <p:spTree>
+      <p:nvGrpSpPr>
+        <p:cNvPr id="1" name=""/>
+        <p:cNvGrpSpPr/>
+        <p:nvPr/>
+      </p:nvGrpSpPr>
+      <p:grpSpPr>
+        <a:xfrm>
+          <a:off x="0" y="0"/>
+          <a:ext cx="0" cy="0"/>
+          <a:chOff x="0" y="0"/>
+          <a:chExt cx="0" cy="0"/>
+        </a:xfrm>
+      </p:grpSpPr>
+      <p:sp>
+        <p:nvSpPr>
+          <p:cNvPr id="2" name="Title 1">
+            <a:extLst>
+              <a:ext uri="{FF2B5EF4-FFF2-40B4-BE49-F238E27FC236}">
+                <a16:creationId xmlns:a16="http://schemas.microsoft.com/office/drawing/2014/main" id="{764C89C7-D0B0-439F-89AC-F9917862B6A8}"/>
+              </a:ext>
+            </a:extLst>
+          </p:cNvPr>
+          <p:cNvSpPr>
+            <a:spLocks noGrp="1"/>
+          </p:cNvSpPr>
+          <p:nvPr>
+            <p:ph type="title"/>
+          </p:nvPr>
+        </p:nvSpPr>
+        <p:spPr/>
+        <p:txBody>
+          <a:bodyPr/>
+          <a:lstStyle/>
+          <a:p>
+            <a:r>
+              <a:rPr lang="en-GB" dirty="0"/>
+              <a:t>Next Permutation </a:t>
+            </a:r>
+          </a:p>
+        </p:txBody>
+      </p:sp>
+      <p:sp>
+        <p:nvSpPr>
+          <p:cNvPr id="3" name="Content Placeholder 2">
+            <a:extLst>
+              <a:ext uri="{FF2B5EF4-FFF2-40B4-BE49-F238E27FC236}">
+                <a16:creationId xmlns:a16="http://schemas.microsoft.com/office/drawing/2014/main" id="{67A5ED38-47A4-4C54-B243-D95EDAA1CC71}"/>
+              </a:ext>
+            </a:extLst>
+          </p:cNvPr>
+          <p:cNvSpPr>
+            <a:spLocks noGrp="1"/>
+          </p:cNvSpPr>
+          <p:nvPr>
+            <p:ph idx="1"/>
+          </p:nvPr>
+        </p:nvSpPr>
+        <p:spPr/>
+        <p:txBody>
+          <a:bodyPr/>
+          <a:lstStyle/>
+          <a:p>
+            <a:r>
+              <a:rPr lang="en-GB" dirty="0"/>
               <a:t>Python </a:t>
             </a:r>
             <a:r>
@@ -4125,7 +4591,7 @@
 </p:sld>
 </file>
 
-<file path=ppt/slides/slide13.xml><?xml version="1.0" encoding="utf-8"?>
+<file path=ppt/slides/slide14.xml><?xml version="1.0" encoding="utf-8"?>
 <p:sld xmlns:a="http://schemas.openxmlformats.org/drawingml/2006/main" xmlns:r="http://schemas.openxmlformats.org/officeDocument/2006/relationships" xmlns:p="http://schemas.openxmlformats.org/presentationml/2006/main">
   <p:cSld>
     <p:spTree>
@@ -4293,7 +4759,149 @@
 </p:sld>
 </file>
 
-<file path=ppt/slides/slide14.xml><?xml version="1.0" encoding="utf-8"?>
+<file path=ppt/slides/slide15.xml><?xml version="1.0" encoding="utf-8"?>
+<p:sld xmlns:a="http://schemas.openxmlformats.org/drawingml/2006/main" xmlns:r="http://schemas.openxmlformats.org/officeDocument/2006/relationships" xmlns:p="http://schemas.openxmlformats.org/presentationml/2006/main">
+  <p:cSld>
+    <p:spTree>
+      <p:nvGrpSpPr>
+        <p:cNvPr id="1" name=""/>
+        <p:cNvGrpSpPr/>
+        <p:nvPr/>
+      </p:nvGrpSpPr>
+      <p:grpSpPr>
+        <a:xfrm>
+          <a:off x="0" y="0"/>
+          <a:ext cx="0" cy="0"/>
+          <a:chOff x="0" y="0"/>
+          <a:chExt cx="0" cy="0"/>
+        </a:xfrm>
+      </p:grpSpPr>
+      <p:sp>
+        <p:nvSpPr>
+          <p:cNvPr id="2" name="Title 1">
+            <a:extLst>
+              <a:ext uri="{FF2B5EF4-FFF2-40B4-BE49-F238E27FC236}">
+                <a16:creationId xmlns:a16="http://schemas.microsoft.com/office/drawing/2014/main" id="{717E9166-698C-41FD-AD6E-E3CDE18C7D19}"/>
+              </a:ext>
+            </a:extLst>
+          </p:cNvPr>
+          <p:cNvSpPr>
+            <a:spLocks noGrp="1"/>
+          </p:cNvSpPr>
+          <p:nvPr>
+            <p:ph type="title"/>
+          </p:nvPr>
+        </p:nvSpPr>
+        <p:spPr/>
+        <p:txBody>
+          <a:bodyPr/>
+          <a:lstStyle/>
+          <a:p>
+            <a:r>
+              <a:rPr lang="en-GB" dirty="0" err="1"/>
+              <a:t>Referencias</a:t>
+            </a:r>
+            <a:endParaRPr lang="en-GB" dirty="0"/>
+          </a:p>
+        </p:txBody>
+      </p:sp>
+      <p:sp>
+        <p:nvSpPr>
+          <p:cNvPr id="3" name="Content Placeholder 2">
+            <a:extLst>
+              <a:ext uri="{FF2B5EF4-FFF2-40B4-BE49-F238E27FC236}">
+                <a16:creationId xmlns:a16="http://schemas.microsoft.com/office/drawing/2014/main" id="{AD75A643-82BA-49DE-9769-65A3280CDD73}"/>
+              </a:ext>
+            </a:extLst>
+          </p:cNvPr>
+          <p:cNvSpPr>
+            <a:spLocks noGrp="1"/>
+          </p:cNvSpPr>
+          <p:nvPr>
+            <p:ph idx="1"/>
+          </p:nvPr>
+        </p:nvSpPr>
+        <p:spPr/>
+        <p:txBody>
+          <a:bodyPr/>
+          <a:lstStyle/>
+          <a:p>
+            <a:r>
+              <a:rPr lang="en-US" b="0" i="0" dirty="0">
+                <a:solidFill>
+                  <a:srgbClr val="222222"/>
+                </a:solidFill>
+                <a:effectLst/>
+                <a:latin typeface="Arial" panose="020B0604020202020204" pitchFamily="34" charset="0"/>
+              </a:rPr>
+              <a:t>Laaksonen, A. (2020). </a:t>
+            </a:r>
+            <a:r>
+              <a:rPr lang="en-US" b="0" i="1" dirty="0">
+                <a:solidFill>
+                  <a:srgbClr val="222222"/>
+                </a:solidFill>
+                <a:effectLst/>
+                <a:latin typeface="Arial" panose="020B0604020202020204" pitchFamily="34" charset="0"/>
+              </a:rPr>
+              <a:t>Guide to competitive programming</a:t>
+            </a:r>
+            <a:r>
+              <a:rPr lang="en-US" b="0" i="0" dirty="0">
+                <a:solidFill>
+                  <a:srgbClr val="222222"/>
+                </a:solidFill>
+                <a:effectLst/>
+                <a:latin typeface="Arial" panose="020B0604020202020204" pitchFamily="34" charset="0"/>
+              </a:rPr>
+              <a:t>. Springer International Publishing.</a:t>
+            </a:r>
+          </a:p>
+          <a:p>
+            <a:r>
+              <a:rPr lang="en-GB" dirty="0">
+                <a:hlinkClick r:id="rId2"/>
+              </a:rPr>
+              <a:t>http://www.cplusplus.com/reference/algorithm/next_permutation/</a:t>
+            </a:r>
+            <a:endParaRPr lang="en-US" i="0" dirty="0">
+              <a:solidFill>
+                <a:srgbClr val="222222"/>
+              </a:solidFill>
+              <a:latin typeface="Arial" panose="020B0604020202020204" pitchFamily="34" charset="0"/>
+            </a:endParaRPr>
+          </a:p>
+          <a:p>
+            <a:r>
+              <a:rPr lang="en-GB" dirty="0">
+                <a:hlinkClick r:id="rId3"/>
+              </a:rPr>
+              <a:t>https://codeforces.com/blog/entry/3980</a:t>
+            </a:r>
+            <a:endParaRPr lang="en-GB" dirty="0"/>
+          </a:p>
+          <a:p>
+            <a:pPr marL="0" indent="0">
+              <a:buNone/>
+            </a:pPr>
+            <a:endParaRPr lang="en-GB" dirty="0"/>
+          </a:p>
+        </p:txBody>
+      </p:sp>
+    </p:spTree>
+    <p:extLst>
+      <p:ext uri="{BB962C8B-B14F-4D97-AF65-F5344CB8AC3E}">
+        <p14:creationId xmlns:p14="http://schemas.microsoft.com/office/powerpoint/2010/main" val="4102552918"/>
+      </p:ext>
+    </p:extLst>
+  </p:cSld>
+  <p:clrMapOvr>
+    <a:masterClrMapping/>
+  </p:clrMapOvr>
+</p:sld>
+</file>
+
+<file path=ppt/slides/slide16.xml><?xml version="1.0" encoding="utf-8"?>
 <p:sld xmlns:a="http://schemas.openxmlformats.org/drawingml/2006/main" xmlns:r="http://schemas.openxmlformats.org/officeDocument/2006/relationships" xmlns:p="http://schemas.openxmlformats.org/presentationml/2006/main">
   <p:cSld>
     <p:spTree>
@@ -4771,6 +5379,141 @@
           <a:chExt cx="0" cy="0"/>
         </a:xfrm>
       </p:grpSpPr>
+      <p:sp>
+        <p:nvSpPr>
+          <p:cNvPr id="2" name="Title 1">
+            <a:extLst>
+              <a:ext uri="{FF2B5EF4-FFF2-40B4-BE49-F238E27FC236}">
+                <a16:creationId xmlns:a16="http://schemas.microsoft.com/office/drawing/2014/main" id="{61D83E1C-8823-4E8B-A826-A7FD843D084C}"/>
+              </a:ext>
+            </a:extLst>
+          </p:cNvPr>
+          <p:cNvSpPr>
+            <a:spLocks noGrp="1"/>
+          </p:cNvSpPr>
+          <p:nvPr>
+            <p:ph type="title"/>
+          </p:nvPr>
+        </p:nvSpPr>
+        <p:spPr/>
+        <p:txBody>
+          <a:bodyPr/>
+          <a:lstStyle/>
+          <a:p>
+            <a:endParaRPr lang="en-GB"/>
+          </a:p>
+        </p:txBody>
+      </p:sp>
+      <p:pic>
+        <p:nvPicPr>
+          <p:cNvPr id="4" name="Content Placeholder 4" descr="Table&#10;&#10;Description automatically generated">
+            <a:extLst>
+              <a:ext uri="{FF2B5EF4-FFF2-40B4-BE49-F238E27FC236}">
+                <a16:creationId xmlns:a16="http://schemas.microsoft.com/office/drawing/2014/main" id="{137A37C3-3D8C-4240-94E1-0FDCC16D6B38}"/>
+              </a:ext>
+            </a:extLst>
+          </p:cNvPr>
+          <p:cNvPicPr>
+            <a:picLocks noGrp="1" noChangeAspect="1"/>
+          </p:cNvPicPr>
+          <p:nvPr>
+            <p:ph idx="1"/>
+          </p:nvPr>
+        </p:nvPicPr>
+        <p:blipFill>
+          <a:blip r:embed="rId2"/>
+          <a:stretch>
+            <a:fillRect/>
+          </a:stretch>
+        </p:blipFill>
+        <p:spPr>
+          <a:xfrm>
+            <a:off x="1456890" y="2134152"/>
+            <a:ext cx="6230219" cy="3458058"/>
+          </a:xfrm>
+        </p:spPr>
+      </p:pic>
+      <mc:AlternateContent xmlns:mc="http://schemas.openxmlformats.org/markup-compatibility/2006">
+        <mc:Choice xmlns:p14="http://schemas.microsoft.com/office/powerpoint/2010/main" Requires="p14">
+          <p:contentPart p14:bwMode="auto" r:id="rId3">
+            <p14:nvContentPartPr>
+              <p14:cNvPr id="3" name="Ink 2">
+                <a:extLst>
+                  <a:ext uri="{FF2B5EF4-FFF2-40B4-BE49-F238E27FC236}">
+                    <a16:creationId xmlns:a16="http://schemas.microsoft.com/office/drawing/2014/main" id="{9874491F-5B0C-4FE7-9442-5D3BC768BD15}"/>
+                  </a:ext>
+                </a:extLst>
+              </p14:cNvPr>
+              <p14:cNvContentPartPr/>
+              <p14:nvPr/>
+            </p14:nvContentPartPr>
+            <p14:xfrm>
+              <a:off x="1314720" y="3861360"/>
+              <a:ext cx="3423240" cy="218880"/>
+            </p14:xfrm>
+          </p:contentPart>
+        </mc:Choice>
+        <mc:Fallback>
+          <p:pic>
+            <p:nvPicPr>
+              <p:cNvPr id="3" name="Ink 2">
+                <a:extLst>
+                  <a:ext uri="{FF2B5EF4-FFF2-40B4-BE49-F238E27FC236}">
+                    <a16:creationId xmlns:a16="http://schemas.microsoft.com/office/drawing/2014/main" id="{9874491F-5B0C-4FE7-9442-5D3BC768BD15}"/>
+                  </a:ext>
+                </a:extLst>
+              </p:cNvPr>
+              <p:cNvPicPr/>
+              <p:nvPr/>
+            </p:nvPicPr>
+            <p:blipFill>
+              <a:blip r:embed="rId4"/>
+              <a:stretch>
+                <a:fillRect/>
+              </a:stretch>
+            </p:blipFill>
+            <p:spPr>
+              <a:xfrm>
+                <a:off x="1305360" y="3852000"/>
+                <a:ext cx="3441960" cy="237600"/>
+              </a:xfrm>
+              <a:prstGeom prst="rect">
+                <a:avLst/>
+              </a:prstGeom>
+            </p:spPr>
+          </p:pic>
+        </mc:Fallback>
+      </mc:AlternateContent>
+    </p:spTree>
+    <p:extLst>
+      <p:ext uri="{BB962C8B-B14F-4D97-AF65-F5344CB8AC3E}">
+        <p14:creationId xmlns:p14="http://schemas.microsoft.com/office/powerpoint/2010/main" val="926180019"/>
+      </p:ext>
+    </p:extLst>
+  </p:cSld>
+  <p:clrMapOvr>
+    <a:masterClrMapping/>
+  </p:clrMapOvr>
+</p:sld>
+</file>
+
+<file path=ppt/slides/slide4.xml><?xml version="1.0" encoding="utf-8"?>
+<p:sld xmlns:a="http://schemas.openxmlformats.org/drawingml/2006/main" xmlns:r="http://schemas.openxmlformats.org/officeDocument/2006/relationships" xmlns:p="http://schemas.openxmlformats.org/presentationml/2006/main">
+  <p:cSld>
+    <p:spTree>
+      <p:nvGrpSpPr>
+        <p:cNvPr id="1" name=""/>
+        <p:cNvGrpSpPr/>
+        <p:nvPr/>
+      </p:nvGrpSpPr>
+      <p:grpSpPr>
+        <a:xfrm>
+          <a:off x="0" y="0"/>
+          <a:ext cx="0" cy="0"/>
+          <a:chOff x="0" y="0"/>
+          <a:chExt cx="0" cy="0"/>
+        </a:xfrm>
+      </p:grpSpPr>
       <p:pic>
         <p:nvPicPr>
           <p:cNvPr id="2" name="Picture 1"/>
@@ -5193,7 +5936,7 @@
 </p:sld>
 </file>
 
-<file path=ppt/slides/slide4.xml><?xml version="1.0" encoding="utf-8"?>
+<file path=ppt/slides/slide5.xml><?xml version="1.0" encoding="utf-8"?>
 <p:sld xmlns:a="http://schemas.openxmlformats.org/drawingml/2006/main" xmlns:r="http://schemas.openxmlformats.org/officeDocument/2006/relationships" xmlns:p="http://schemas.openxmlformats.org/presentationml/2006/main">
   <p:cSld>
     <p:spTree>
@@ -5793,7 +6536,7 @@
 </p:sld>
 </file>
 
-<file path=ppt/slides/slide5.xml><?xml version="1.0" encoding="utf-8"?>
+<file path=ppt/slides/slide6.xml><?xml version="1.0" encoding="utf-8"?>
 <p:sld xmlns:a="http://schemas.openxmlformats.org/drawingml/2006/main" xmlns:r="http://schemas.openxmlformats.org/officeDocument/2006/relationships" xmlns:p="http://schemas.openxmlformats.org/presentationml/2006/main">
   <p:cSld>
     <p:spTree>
@@ -6276,7 +7019,7 @@
 </p:sld>
 </file>
 
-<file path=ppt/slides/slide6.xml><?xml version="1.0" encoding="utf-8"?>
+<file path=ppt/slides/slide7.xml><?xml version="1.0" encoding="utf-8"?>
 <p:sld xmlns:a="http://schemas.openxmlformats.org/drawingml/2006/main" xmlns:r="http://schemas.openxmlformats.org/officeDocument/2006/relationships" xmlns:p="http://schemas.openxmlformats.org/presentationml/2006/main">
   <p:cSld>
     <p:spTree>
@@ -6549,7 +7292,7 @@
 </p:sld>
 </file>
 
-<file path=ppt/slides/slide7.xml><?xml version="1.0" encoding="utf-8"?>
+<file path=ppt/slides/slide8.xml><?xml version="1.0" encoding="utf-8"?>
 <p:sld xmlns:a="http://schemas.openxmlformats.org/drawingml/2006/main" xmlns:r="http://schemas.openxmlformats.org/officeDocument/2006/relationships" xmlns:p="http://schemas.openxmlformats.org/presentationml/2006/main">
   <p:cSld>
     <p:spTree>
@@ -8606,7 +9349,7 @@
 </p:sld>
 </file>
 
-<file path=ppt/slides/slide8.xml><?xml version="1.0" encoding="utf-8"?>
+<file path=ppt/slides/slide9.xml><?xml version="1.0" encoding="utf-8"?>
 <p:sld xmlns:a="http://schemas.openxmlformats.org/drawingml/2006/main" xmlns:r="http://schemas.openxmlformats.org/officeDocument/2006/relationships" xmlns:p="http://schemas.openxmlformats.org/presentationml/2006/main">
   <p:cSld>
     <p:spTree>
@@ -9657,435 +10400,6 @@
     <p:extLst>
       <p:ext uri="{BB962C8B-B14F-4D97-AF65-F5344CB8AC3E}">
         <p14:creationId xmlns:p14="http://schemas.microsoft.com/office/powerpoint/2010/main" val="2744985617"/>
-      </p:ext>
-    </p:extLst>
-  </p:cSld>
-  <p:clrMapOvr>
-    <a:masterClrMapping/>
-  </p:clrMapOvr>
-</p:sld>
-</file>
-
-<file path=ppt/slides/slide9.xml><?xml version="1.0" encoding="utf-8"?>
-<p:sld xmlns:a="http://schemas.openxmlformats.org/drawingml/2006/main" xmlns:r="http://schemas.openxmlformats.org/officeDocument/2006/relationships" xmlns:p="http://schemas.openxmlformats.org/presentationml/2006/main">
-  <p:cSld>
-    <p:spTree>
-      <p:nvGrpSpPr>
-        <p:cNvPr id="1" name=""/>
-        <p:cNvGrpSpPr/>
-        <p:nvPr/>
-      </p:nvGrpSpPr>
-      <p:grpSpPr>
-        <a:xfrm>
-          <a:off x="0" y="0"/>
-          <a:ext cx="0" cy="0"/>
-          <a:chOff x="0" y="0"/>
-          <a:chExt cx="0" cy="0"/>
-        </a:xfrm>
-      </p:grpSpPr>
-      <p:sp>
-        <p:nvSpPr>
-          <p:cNvPr id="2" name="Title 1">
-            <a:extLst>
-              <a:ext uri="{FF2B5EF4-FFF2-40B4-BE49-F238E27FC236}">
-                <a16:creationId xmlns:a16="http://schemas.microsoft.com/office/drawing/2014/main" id="{2B2179BA-B504-400E-887A-74F4A063F12B}"/>
-              </a:ext>
-            </a:extLst>
-          </p:cNvPr>
-          <p:cNvSpPr>
-            <a:spLocks noGrp="1"/>
-          </p:cNvSpPr>
-          <p:nvPr>
-            <p:ph type="title"/>
-          </p:nvPr>
-        </p:nvSpPr>
-        <p:spPr/>
-        <p:txBody>
-          <a:bodyPr/>
-          <a:lstStyle/>
-          <a:p>
-            <a:r>
-              <a:rPr lang="en-GB" dirty="0"/>
-              <a:t>Operations</a:t>
-            </a:r>
-          </a:p>
-        </p:txBody>
-      </p:sp>
-      <p:sp>
-        <p:nvSpPr>
-          <p:cNvPr id="3" name="Content Placeholder 2">
-            <a:extLst>
-              <a:ext uri="{FF2B5EF4-FFF2-40B4-BE49-F238E27FC236}">
-                <a16:creationId xmlns:a16="http://schemas.microsoft.com/office/drawing/2014/main" id="{1F236050-014D-4E76-91CE-55E989BE334F}"/>
-              </a:ext>
-            </a:extLst>
-          </p:cNvPr>
-          <p:cNvSpPr>
-            <a:spLocks noGrp="1"/>
-          </p:cNvSpPr>
-          <p:nvPr>
-            <p:ph idx="1"/>
-          </p:nvPr>
-        </p:nvSpPr>
-        <p:spPr/>
-        <p:txBody>
-          <a:bodyPr/>
-          <a:lstStyle/>
-          <a:p>
-            <a:r>
-              <a:rPr lang="en-US" b="1" i="0" dirty="0">
-                <a:solidFill>
-                  <a:srgbClr val="292929"/>
-                </a:solidFill>
-                <a:effectLst/>
-                <a:latin typeface="medium-content-serif-font"/>
-              </a:rPr>
-              <a:t>1) Set the </a:t>
-            </a:r>
-            <a:r>
-              <a:rPr lang="en-US" b="1" i="0" dirty="0" err="1">
-                <a:solidFill>
-                  <a:srgbClr val="292929"/>
-                </a:solidFill>
-                <a:effectLst/>
-                <a:latin typeface="medium-content-serif-font"/>
-              </a:rPr>
-              <a:t>i-th</a:t>
-            </a:r>
-            <a:r>
-              <a:rPr lang="en-US" b="1" i="0" dirty="0">
-                <a:solidFill>
-                  <a:srgbClr val="292929"/>
-                </a:solidFill>
-                <a:effectLst/>
-                <a:latin typeface="medium-content-serif-font"/>
-              </a:rPr>
-              <a:t> bit : </a:t>
-            </a:r>
-            <a:r>
-              <a:rPr lang="en-US" b="0" i="0" dirty="0">
-                <a:solidFill>
-                  <a:srgbClr val="292929"/>
-                </a:solidFill>
-                <a:effectLst/>
-                <a:latin typeface="medium-content-serif-font"/>
-              </a:rPr>
-              <a:t>B = B | (1&lt;&lt;</a:t>
-            </a:r>
-            <a:r>
-              <a:rPr lang="en-US" b="0" i="0" dirty="0" err="1">
-                <a:solidFill>
-                  <a:srgbClr val="292929"/>
-                </a:solidFill>
-                <a:effectLst/>
-                <a:latin typeface="medium-content-serif-font"/>
-              </a:rPr>
-              <a:t>i</a:t>
-            </a:r>
-            <a:r>
-              <a:rPr lang="en-US" b="0" i="0" dirty="0">
-                <a:solidFill>
-                  <a:srgbClr val="292929"/>
-                </a:solidFill>
-                <a:effectLst/>
-                <a:latin typeface="medium-content-serif-font"/>
-              </a:rPr>
-              <a:t>)</a:t>
-            </a:r>
-            <a:br>
-              <a:rPr lang="en-US" b="1" i="0" dirty="0">
-                <a:solidFill>
-                  <a:srgbClr val="292929"/>
-                </a:solidFill>
-                <a:effectLst/>
-                <a:latin typeface="medium-content-serif-font"/>
-              </a:rPr>
-            </a:br>
-            <a:r>
-              <a:rPr lang="en-US" b="1" i="0" dirty="0">
-                <a:solidFill>
-                  <a:srgbClr val="292929"/>
-                </a:solidFill>
-                <a:effectLst/>
-                <a:latin typeface="medium-content-serif-font"/>
-              </a:rPr>
-              <a:t>2) Unset the </a:t>
-            </a:r>
-            <a:r>
-              <a:rPr lang="en-US" b="1" i="0" dirty="0" err="1">
-                <a:solidFill>
-                  <a:srgbClr val="292929"/>
-                </a:solidFill>
-                <a:effectLst/>
-                <a:latin typeface="medium-content-serif-font"/>
-              </a:rPr>
-              <a:t>i-th</a:t>
-            </a:r>
-            <a:r>
-              <a:rPr lang="en-US" b="1" i="0" dirty="0">
-                <a:solidFill>
-                  <a:srgbClr val="292929"/>
-                </a:solidFill>
-                <a:effectLst/>
-                <a:latin typeface="medium-content-serif-font"/>
-              </a:rPr>
-              <a:t> bit: </a:t>
-            </a:r>
-            <a:r>
-              <a:rPr lang="en-US" b="0" i="0" dirty="0">
-                <a:solidFill>
-                  <a:srgbClr val="292929"/>
-                </a:solidFill>
-                <a:effectLst/>
-                <a:latin typeface="medium-content-serif-font"/>
-              </a:rPr>
-              <a:t>B = B &amp;! (1&lt;&lt;</a:t>
-            </a:r>
-            <a:r>
-              <a:rPr lang="en-US" b="0" i="0" dirty="0" err="1">
-                <a:solidFill>
-                  <a:srgbClr val="292929"/>
-                </a:solidFill>
-                <a:effectLst/>
-                <a:latin typeface="medium-content-serif-font"/>
-              </a:rPr>
-              <a:t>i</a:t>
-            </a:r>
-            <a:r>
-              <a:rPr lang="en-US" b="0" i="0" dirty="0">
-                <a:solidFill>
-                  <a:srgbClr val="292929"/>
-                </a:solidFill>
-                <a:effectLst/>
-                <a:latin typeface="medium-content-serif-font"/>
-              </a:rPr>
-              <a:t>)</a:t>
-            </a:r>
-            <a:br>
-              <a:rPr lang="en-US" b="1" i="0" dirty="0">
-                <a:solidFill>
-                  <a:srgbClr val="292929"/>
-                </a:solidFill>
-                <a:effectLst/>
-                <a:latin typeface="medium-content-serif-font"/>
-              </a:rPr>
-            </a:br>
-            <a:r>
-              <a:rPr lang="en-US" b="1" i="0" dirty="0">
-                <a:solidFill>
-                  <a:srgbClr val="292929"/>
-                </a:solidFill>
-                <a:effectLst/>
-                <a:latin typeface="medium-content-serif-font"/>
-              </a:rPr>
-              <a:t>3) Check if </a:t>
-            </a:r>
-            <a:r>
-              <a:rPr lang="en-US" b="1" i="0" dirty="0" err="1">
-                <a:solidFill>
-                  <a:srgbClr val="292929"/>
-                </a:solidFill>
-                <a:effectLst/>
-                <a:latin typeface="medium-content-serif-font"/>
-              </a:rPr>
-              <a:t>i-th</a:t>
-            </a:r>
-            <a:r>
-              <a:rPr lang="en-US" b="1" i="0" dirty="0">
-                <a:solidFill>
-                  <a:srgbClr val="292929"/>
-                </a:solidFill>
-                <a:effectLst/>
-                <a:latin typeface="medium-content-serif-font"/>
-              </a:rPr>
-              <a:t> bit is set: </a:t>
-            </a:r>
-            <a:r>
-              <a:rPr lang="en-US" b="0" i="0" dirty="0">
-                <a:solidFill>
-                  <a:srgbClr val="292929"/>
-                </a:solidFill>
-                <a:effectLst/>
-                <a:latin typeface="medium-content-serif-font"/>
-              </a:rPr>
-              <a:t>B &amp; (1&lt;&lt;</a:t>
-            </a:r>
-            <a:r>
-              <a:rPr lang="en-US" b="0" i="0" dirty="0" err="1">
-                <a:solidFill>
-                  <a:srgbClr val="292929"/>
-                </a:solidFill>
-                <a:effectLst/>
-                <a:latin typeface="medium-content-serif-font"/>
-              </a:rPr>
-              <a:t>i</a:t>
-            </a:r>
-            <a:r>
-              <a:rPr lang="en-US" b="0" i="0" dirty="0">
-                <a:solidFill>
-                  <a:srgbClr val="292929"/>
-                </a:solidFill>
-                <a:effectLst/>
-                <a:latin typeface="medium-content-serif-font"/>
-              </a:rPr>
-              <a:t>)</a:t>
-            </a:r>
-            <a:r>
-              <a:rPr lang="en-US" b="1" i="0" dirty="0">
-                <a:solidFill>
-                  <a:srgbClr val="292929"/>
-                </a:solidFill>
-                <a:effectLst/>
-                <a:latin typeface="medium-content-serif-font"/>
-              </a:rPr>
-              <a:t> </a:t>
-            </a:r>
-            <a:r>
-              <a:rPr lang="en-US" b="0" i="0" dirty="0">
-                <a:solidFill>
-                  <a:srgbClr val="292929"/>
-                </a:solidFill>
-                <a:effectLst/>
-                <a:latin typeface="medium-content-serif-font"/>
-              </a:rPr>
-              <a:t>→</a:t>
-            </a:r>
-            <a:r>
-              <a:rPr lang="en-US" b="0" i="1" dirty="0">
-                <a:solidFill>
-                  <a:srgbClr val="292929"/>
-                </a:solidFill>
-                <a:effectLst/>
-                <a:latin typeface="medium-content-serif-font"/>
-              </a:rPr>
-              <a:t> if </a:t>
-            </a:r>
-            <a:r>
-              <a:rPr lang="en-US" b="0" i="1" dirty="0" err="1">
-                <a:solidFill>
-                  <a:srgbClr val="292929"/>
-                </a:solidFill>
-                <a:effectLst/>
-                <a:latin typeface="medium-content-serif-font"/>
-              </a:rPr>
-              <a:t>i-th</a:t>
-            </a:r>
-            <a:r>
-              <a:rPr lang="en-US" b="0" i="1" dirty="0">
-                <a:solidFill>
-                  <a:srgbClr val="292929"/>
-                </a:solidFill>
-                <a:effectLst/>
-                <a:latin typeface="medium-content-serif-font"/>
-              </a:rPr>
-              <a:t> bit is set, we get a non-zero integer otherwise we get a zero</a:t>
-            </a:r>
-            <a:br>
-              <a:rPr lang="en-US" b="0" i="1" dirty="0">
-                <a:solidFill>
-                  <a:srgbClr val="292929"/>
-                </a:solidFill>
-                <a:effectLst/>
-                <a:latin typeface="medium-content-serif-font"/>
-              </a:rPr>
-            </a:br>
-            <a:r>
-              <a:rPr lang="en-US" b="1" i="1" dirty="0">
-                <a:solidFill>
-                  <a:srgbClr val="292929"/>
-                </a:solidFill>
-                <a:effectLst/>
-                <a:latin typeface="medium-content-serif-font"/>
-              </a:rPr>
-              <a:t>4) Swap the </a:t>
-            </a:r>
-            <a:r>
-              <a:rPr lang="en-US" b="1" i="1" dirty="0" err="1">
-                <a:solidFill>
-                  <a:srgbClr val="292929"/>
-                </a:solidFill>
-                <a:effectLst/>
-                <a:latin typeface="medium-content-serif-font"/>
-              </a:rPr>
-              <a:t>i-th</a:t>
-            </a:r>
-            <a:r>
-              <a:rPr lang="en-US" b="1" i="1" dirty="0">
-                <a:solidFill>
-                  <a:srgbClr val="292929"/>
-                </a:solidFill>
-                <a:effectLst/>
-                <a:latin typeface="medium-content-serif-font"/>
-              </a:rPr>
-              <a:t> item of the set:</a:t>
-            </a:r>
-            <a:r>
-              <a:rPr lang="en-US" b="0" i="1" dirty="0">
-                <a:solidFill>
-                  <a:srgbClr val="292929"/>
-                </a:solidFill>
-                <a:effectLst/>
-                <a:latin typeface="medium-content-serif-font"/>
-              </a:rPr>
-              <a:t> B =B ^ (1&lt;&lt;</a:t>
-            </a:r>
-            <a:r>
-              <a:rPr lang="en-US" b="0" i="1" dirty="0" err="1">
-                <a:solidFill>
-                  <a:srgbClr val="292929"/>
-                </a:solidFill>
-                <a:effectLst/>
-                <a:latin typeface="medium-content-serif-font"/>
-              </a:rPr>
-              <a:t>i</a:t>
-            </a:r>
-            <a:r>
-              <a:rPr lang="en-US" b="0" i="1" dirty="0">
-                <a:solidFill>
-                  <a:srgbClr val="292929"/>
-                </a:solidFill>
-                <a:effectLst/>
-                <a:latin typeface="medium-content-serif-font"/>
-              </a:rPr>
-              <a:t>)</a:t>
-            </a:r>
-            <a:br>
-              <a:rPr lang="en-US" b="0" i="1" dirty="0">
-                <a:solidFill>
-                  <a:srgbClr val="292929"/>
-                </a:solidFill>
-                <a:effectLst/>
-                <a:latin typeface="medium-content-serif-font"/>
-              </a:rPr>
-            </a:br>
-            <a:r>
-              <a:rPr lang="en-US" b="1" i="1" dirty="0">
-                <a:solidFill>
-                  <a:srgbClr val="292929"/>
-                </a:solidFill>
-                <a:effectLst/>
-                <a:latin typeface="medium-content-serif-font"/>
-              </a:rPr>
-              <a:t>5) Turn On all the bits in a set of size ‘n’:</a:t>
-            </a:r>
-            <a:r>
-              <a:rPr lang="en-US" b="0" i="1" dirty="0">
-                <a:solidFill>
-                  <a:srgbClr val="292929"/>
-                </a:solidFill>
-                <a:effectLst/>
-                <a:latin typeface="medium-content-serif-font"/>
-              </a:rPr>
-              <a:t> B = (1&lt;&lt;n)-1</a:t>
-            </a:r>
-            <a:endParaRPr lang="en-GB" dirty="0"/>
-          </a:p>
-        </p:txBody>
-      </p:sp>
-    </p:spTree>
-    <p:extLst>
-      <p:ext uri="{BB962C8B-B14F-4D97-AF65-F5344CB8AC3E}">
-        <p14:creationId xmlns:p14="http://schemas.microsoft.com/office/powerpoint/2010/main" val="2985432943"/>
       </p:ext>
     </p:extLst>
   </p:cSld>

</xml_diff>